<commit_message>
coding the nav bar
</commit_message>
<xml_diff>
--- a/Documentations/Supervisor Meeting PowerPoints/14._Supervisor_Meeting_26Feb21.pptx
+++ b/Documentations/Supervisor Meeting PowerPoints/14._Supervisor_Meeting_26Feb21.pptx
@@ -10,7 +10,7 @@
   <p:sldIdLst>
     <p:sldId id="256" r:id="rId2"/>
     <p:sldId id="257" r:id="rId3"/>
-    <p:sldId id="396" r:id="rId4"/>
+    <p:sldId id="397" r:id="rId4"/>
     <p:sldId id="395" r:id="rId5"/>
     <p:sldId id="331" r:id="rId6"/>
   </p:sldIdLst>
@@ -5551,7 +5551,7 @@
           <a:p>
             <a:fld id="{F3B73EDB-C001-4FA3-A8F8-70B0B97F7CFF}" type="datetimeFigureOut">
               <a:rPr lang="en-GB" smtClean="0"/>
-              <a:t>24/02/2021</a:t>
+              <a:t>25/02/2021</a:t>
             </a:fld>
             <a:endParaRPr lang="en-GB"/>
           </a:p>
@@ -6061,7 +6061,7 @@
     </p:spTree>
     <p:extLst>
       <p:ext uri="{BB962C8B-B14F-4D97-AF65-F5344CB8AC3E}">
-        <p14:creationId xmlns:p14="http://schemas.microsoft.com/office/powerpoint/2010/main" val="809650354"/>
+        <p14:creationId xmlns:p14="http://schemas.microsoft.com/office/powerpoint/2010/main" val="1303082862"/>
       </p:ext>
     </p:extLst>
   </p:cSld>
@@ -6378,7 +6378,7 @@
           <a:p>
             <a:fld id="{1D8BD707-D9CF-40AE-B4C6-C98DA3205C09}" type="datetimeFigureOut">
               <a:rPr lang="en-US"/>
-              <a:t>2/24/2021</a:t>
+              <a:t>2/25/2021</a:t>
             </a:fld>
             <a:endParaRPr lang="en-US"/>
           </a:p>
@@ -6553,7 +6553,7 @@
           <a:p>
             <a:fld id="{1D8BD707-D9CF-40AE-B4C6-C98DA3205C09}" type="datetimeFigureOut">
               <a:rPr lang="en-US"/>
-              <a:t>2/24/2021</a:t>
+              <a:t>2/25/2021</a:t>
             </a:fld>
             <a:endParaRPr lang="en-US"/>
           </a:p>
@@ -6767,7 +6767,7 @@
           <a:p>
             <a:fld id="{1D8BD707-D9CF-40AE-B4C6-C98DA3205C09}" type="datetimeFigureOut">
               <a:rPr lang="en-US"/>
-              <a:t>2/24/2021</a:t>
+              <a:t>2/25/2021</a:t>
             </a:fld>
             <a:endParaRPr lang="en-US"/>
           </a:p>
@@ -6915,7 +6915,7 @@
           <a:p>
             <a:fld id="{1D8BD707-D9CF-40AE-B4C6-C98DA3205C09}" type="datetimeFigureOut">
               <a:rPr lang="en-US"/>
-              <a:t>2/24/2021</a:t>
+              <a:t>2/25/2021</a:t>
             </a:fld>
             <a:endParaRPr lang="en-US"/>
           </a:p>
@@ -7034,7 +7034,7 @@
           <a:p>
             <a:fld id="{1D8BD707-D9CF-40AE-B4C6-C98DA3205C09}" type="datetimeFigureOut">
               <a:rPr lang="en-US"/>
-              <a:t>2/24/2021</a:t>
+              <a:t>2/25/2021</a:t>
             </a:fld>
             <a:endParaRPr lang="en-US"/>
           </a:p>
@@ -7257,7 +7257,7 @@
           <a:p>
             <a:fld id="{1D8BD707-D9CF-40AE-B4C6-C98DA3205C09}" type="datetimeFigureOut">
               <a:rPr lang="en-US"/>
-              <a:t>2/24/2021</a:t>
+              <a:t>2/25/2021</a:t>
             </a:fld>
             <a:endParaRPr lang="en-US"/>
           </a:p>
@@ -8299,7 +8299,7 @@
                 <a:latin typeface="Consolas"/>
                 <a:cs typeface="Consolas"/>
               </a:rPr>
-              <a:t>26 February 2021 </a:t>
+              <a:t>25 February 2021 </a:t>
             </a:r>
           </a:p>
         </p:txBody>
@@ -9209,7 +9209,7 @@
         <p:spPr>
           <a:xfrm>
             <a:off x="909103" y="3470056"/>
-            <a:ext cx="6857143" cy="645690"/>
+            <a:ext cx="6857143" cy="3761927"/>
           </a:xfrm>
           <a:prstGeom prst="rect">
             <a:avLst/>
@@ -9229,7 +9229,40 @@
             </a:pPr>
             <a:r>
               <a:rPr lang="en-US" sz="4000" kern="0" dirty="0"/>
-              <a:t>Proofreading dissertation </a:t>
+              <a:t>Proofreading dissertation</a:t>
+            </a:r>
+          </a:p>
+          <a:p>
+            <a:pPr marL="12700">
+              <a:spcBef>
+                <a:spcPts val="100"/>
+              </a:spcBef>
+            </a:pPr>
+            <a:r>
+              <a:rPr lang="en-US" sz="4000" kern="0" dirty="0"/>
+              <a:t>Remove and add multiple orders</a:t>
+            </a:r>
+          </a:p>
+          <a:p>
+            <a:pPr marL="12700">
+              <a:spcBef>
+                <a:spcPts val="100"/>
+              </a:spcBef>
+            </a:pPr>
+            <a:r>
+              <a:rPr lang="en-US" sz="4000" kern="0" dirty="0"/>
+              <a:t>Complicated things that they will fail at too many dishes</a:t>
+            </a:r>
+          </a:p>
+          <a:p>
+            <a:pPr marL="12700">
+              <a:spcBef>
+                <a:spcPts val="100"/>
+              </a:spcBef>
+            </a:pPr>
+            <a:r>
+              <a:rPr lang="en-US" sz="4000" kern="0" dirty="0"/>
+              <a:t>- non-speaker – less precious – order 3 meals, remove 1 meals </a:t>
             </a:r>
           </a:p>
         </p:txBody>
@@ -9858,8 +9891,8 @@
         </p:nvSpPr>
         <p:spPr>
           <a:xfrm>
-            <a:off x="8686800" y="2324100"/>
-            <a:ext cx="6725313" cy="4518545"/>
+            <a:off x="9144000" y="3091746"/>
+            <a:ext cx="6725313" cy="4975080"/>
           </a:xfrm>
           <a:prstGeom prst="rect">
             <a:avLst/>
@@ -9884,7 +9917,7 @@
                 <a:ea typeface="Roboto" panose="02000000000000000000" pitchFamily="2" charset="0"/>
                 <a:cs typeface="Roboto" panose="02000000000000000000" pitchFamily="2" charset="0"/>
               </a:rPr>
-              <a:t>Evaluation – Google form for 1) native-speaker, 2) non-native speaker</a:t>
+              <a:t>Evaluation – Google form for 1) native-speaker, 2) non-native speaker (Done)</a:t>
             </a:r>
           </a:p>
           <a:p>
@@ -10010,7 +10043,7 @@
     </p:spTree>
     <p:extLst>
       <p:ext uri="{BB962C8B-B14F-4D97-AF65-F5344CB8AC3E}">
-        <p14:creationId xmlns:p14="http://schemas.microsoft.com/office/powerpoint/2010/main" val="2309986543"/>
+        <p14:creationId xmlns:p14="http://schemas.microsoft.com/office/powerpoint/2010/main" val="3069143298"/>
       </p:ext>
     </p:extLst>
   </p:cSld>

</xml_diff>